<commit_message>
Added search for profile
Just realized that the filter for loading more content (if there is such) relies on the front end's search box which means that the consistency of the search will fail if the content of the search box for the specific page that the button is attached to is empty or changed in value.

Still it just a UX issue than one that affects the functionality. Though fixing said issue requires rework on the backend side as well to compensate for the handling of the search filters.
</commit_message>
<xml_diff>
--- a/Documentation/MCO Design.pptx
+++ b/Documentation/MCO Design.pptx
@@ -5671,13 +5671,8 @@
         <a:p>
           <a:r>
             <a:rPr lang="en-PH" sz="700" i="0" u="none" dirty="0"/>
-            <a:t>GET: /profile</a:t>
+            <a:t>GET: /profile/&lt;search&gt;</a:t>
           </a:r>
-          <a:r>
-            <a:rPr lang="en-PH" sz="700" i="0" u="none"/>
-            <a:t>/search</a:t>
-          </a:r>
-          <a:endParaRPr lang="en-PH" sz="700" i="0" u="none" dirty="0"/>
         </a:p>
       </dgm:t>
     </dgm:pt>
@@ -5783,6 +5778,42 @@
         </a:p>
       </dgm:t>
     </dgm:pt>
+    <dgm:pt modelId="{6FF99DC2-0BA1-48DA-AAF4-D1699CD7A605}">
+      <dgm:prSet phldrT="[Text]" custT="1"/>
+      <dgm:spPr/>
+      <dgm:t>
+        <a:bodyPr/>
+        <a:lstStyle/>
+        <a:p>
+          <a:r>
+            <a:rPr lang="en-PH" sz="700" i="0" u="none" dirty="0"/>
+            <a:t>PUT: /profile/&lt;search&gt;/more</a:t>
+          </a:r>
+        </a:p>
+      </dgm:t>
+    </dgm:pt>
+    <dgm:pt modelId="{32AFFDE6-F396-4895-94C1-B7B6E7D93CDA}" type="parTrans" cxnId="{DC582C74-DEDE-408E-819C-A1CB816729C6}">
+      <dgm:prSet/>
+      <dgm:spPr/>
+      <dgm:t>
+        <a:bodyPr/>
+        <a:lstStyle/>
+        <a:p>
+          <a:endParaRPr lang="en-PH"/>
+        </a:p>
+      </dgm:t>
+    </dgm:pt>
+    <dgm:pt modelId="{965B4A1B-C877-42F3-8B70-81F0D1B5EEA9}" type="sibTrans" cxnId="{DC582C74-DEDE-408E-819C-A1CB816729C6}">
+      <dgm:prSet/>
+      <dgm:spPr/>
+      <dgm:t>
+        <a:bodyPr/>
+        <a:lstStyle/>
+        <a:p>
+          <a:endParaRPr lang="en-PH"/>
+        </a:p>
+      </dgm:t>
+    </dgm:pt>
     <dgm:pt modelId="{25F16154-0014-45A6-B140-723A8E51B73E}" type="pres">
       <dgm:prSet presAssocID="{34BEB75E-ED6D-4113-9F50-1BF5F1954990}" presName="hierChild1" presStyleCnt="0">
         <dgm:presLayoutVars>
@@ -6464,6 +6495,42 @@
       <dgm:prSet presAssocID="{F592A012-32A7-4C82-BF4D-CA3D12AD7C92}" presName="hierChild4" presStyleCnt="0"/>
       <dgm:spPr/>
     </dgm:pt>
+    <dgm:pt modelId="{2922A1E1-45E7-4B20-BC89-6A69AD9E22F9}" type="pres">
+      <dgm:prSet presAssocID="{32AFFDE6-F396-4895-94C1-B7B6E7D93CDA}" presName="Name64" presStyleLbl="parChTrans1D4" presStyleIdx="0" presStyleCnt="3"/>
+      <dgm:spPr/>
+    </dgm:pt>
+    <dgm:pt modelId="{537DCF6A-9367-4FD7-9A35-8604FB688617}" type="pres">
+      <dgm:prSet presAssocID="{6FF99DC2-0BA1-48DA-AAF4-D1699CD7A605}" presName="hierRoot2" presStyleCnt="0">
+        <dgm:presLayoutVars>
+          <dgm:hierBranch val="init"/>
+        </dgm:presLayoutVars>
+      </dgm:prSet>
+      <dgm:spPr/>
+    </dgm:pt>
+    <dgm:pt modelId="{8F72091C-B690-4551-8620-C9EE79780856}" type="pres">
+      <dgm:prSet presAssocID="{6FF99DC2-0BA1-48DA-AAF4-D1699CD7A605}" presName="rootComposite" presStyleCnt="0"/>
+      <dgm:spPr/>
+    </dgm:pt>
+    <dgm:pt modelId="{D6E0FA02-0214-49B6-9B94-783FCE0C0294}" type="pres">
+      <dgm:prSet presAssocID="{6FF99DC2-0BA1-48DA-AAF4-D1699CD7A605}" presName="rootText" presStyleLbl="node4" presStyleIdx="0" presStyleCnt="3">
+        <dgm:presLayoutVars>
+          <dgm:chPref val="3"/>
+        </dgm:presLayoutVars>
+      </dgm:prSet>
+      <dgm:spPr/>
+    </dgm:pt>
+    <dgm:pt modelId="{AA76DA7D-3B97-4800-983B-B2B5F5E3A8EF}" type="pres">
+      <dgm:prSet presAssocID="{6FF99DC2-0BA1-48DA-AAF4-D1699CD7A605}" presName="rootConnector" presStyleLbl="node4" presStyleIdx="0" presStyleCnt="3"/>
+      <dgm:spPr/>
+    </dgm:pt>
+    <dgm:pt modelId="{7AD1CA69-F91F-4788-A91F-925FBCF70B86}" type="pres">
+      <dgm:prSet presAssocID="{6FF99DC2-0BA1-48DA-AAF4-D1699CD7A605}" presName="hierChild4" presStyleCnt="0"/>
+      <dgm:spPr/>
+    </dgm:pt>
+    <dgm:pt modelId="{95D16504-E3FD-42AB-BA2A-0D771DC1020E}" type="pres">
+      <dgm:prSet presAssocID="{6FF99DC2-0BA1-48DA-AAF4-D1699CD7A605}" presName="hierChild5" presStyleCnt="0"/>
+      <dgm:spPr/>
+    </dgm:pt>
     <dgm:pt modelId="{99FBEC27-E6A0-4C3F-B74E-C8F2D217826C}" type="pres">
       <dgm:prSet presAssocID="{F592A012-32A7-4C82-BF4D-CA3D12AD7C92}" presName="hierChild5" presStyleCnt="0"/>
       <dgm:spPr/>
@@ -6501,7 +6568,7 @@
       <dgm:spPr/>
     </dgm:pt>
     <dgm:pt modelId="{72A21E04-8D28-4AED-8859-4152E9410BC5}" type="pres">
-      <dgm:prSet presAssocID="{7EB6568E-DE68-41D0-B072-2D0DA56F4F15}" presName="Name64" presStyleLbl="parChTrans1D4" presStyleIdx="0" presStyleCnt="2"/>
+      <dgm:prSet presAssocID="{7EB6568E-DE68-41D0-B072-2D0DA56F4F15}" presName="Name64" presStyleLbl="parChTrans1D4" presStyleIdx="1" presStyleCnt="3"/>
       <dgm:spPr/>
     </dgm:pt>
     <dgm:pt modelId="{C33BE125-A4D5-44B6-ADF4-EE2C04B9342A}" type="pres">
@@ -6517,7 +6584,7 @@
       <dgm:spPr/>
     </dgm:pt>
     <dgm:pt modelId="{A063358C-0698-42F7-9923-2B9323B852DF}" type="pres">
-      <dgm:prSet presAssocID="{9E9AFA18-4A4C-452D-9BB1-22608177395D}" presName="rootText" presStyleLbl="node4" presStyleIdx="0" presStyleCnt="2">
+      <dgm:prSet presAssocID="{9E9AFA18-4A4C-452D-9BB1-22608177395D}" presName="rootText" presStyleLbl="node4" presStyleIdx="1" presStyleCnt="3">
         <dgm:presLayoutVars>
           <dgm:chPref val="3"/>
         </dgm:presLayoutVars>
@@ -6525,7 +6592,7 @@
       <dgm:spPr/>
     </dgm:pt>
     <dgm:pt modelId="{7E787785-54EC-41F4-A62C-9C6FEA7262F7}" type="pres">
-      <dgm:prSet presAssocID="{9E9AFA18-4A4C-452D-9BB1-22608177395D}" presName="rootConnector" presStyleLbl="node4" presStyleIdx="0" presStyleCnt="2"/>
+      <dgm:prSet presAssocID="{9E9AFA18-4A4C-452D-9BB1-22608177395D}" presName="rootConnector" presStyleLbl="node4" presStyleIdx="1" presStyleCnt="3"/>
       <dgm:spPr/>
     </dgm:pt>
     <dgm:pt modelId="{E4B57072-C66E-4481-9AE9-3AD77C82E01F}" type="pres">
@@ -6537,7 +6604,7 @@
       <dgm:spPr/>
     </dgm:pt>
     <dgm:pt modelId="{BA52E6F3-CA60-4E17-A6A4-2CE0C065527E}" type="pres">
-      <dgm:prSet presAssocID="{AF051581-B2C4-4A22-B3E9-D040DD094A2F}" presName="Name64" presStyleLbl="parChTrans1D4" presStyleIdx="1" presStyleCnt="2"/>
+      <dgm:prSet presAssocID="{AF051581-B2C4-4A22-B3E9-D040DD094A2F}" presName="Name64" presStyleLbl="parChTrans1D4" presStyleIdx="2" presStyleCnt="3"/>
       <dgm:spPr/>
     </dgm:pt>
     <dgm:pt modelId="{E68948CE-AC19-488A-B1F5-67E9036735CF}" type="pres">
@@ -6553,7 +6620,7 @@
       <dgm:spPr/>
     </dgm:pt>
     <dgm:pt modelId="{5149C0C6-E11C-4AB0-947A-FEDDB9A1B641}" type="pres">
-      <dgm:prSet presAssocID="{795061A3-2B93-41B7-8CB3-D2EA827D06F1}" presName="rootText" presStyleLbl="node4" presStyleIdx="1" presStyleCnt="2">
+      <dgm:prSet presAssocID="{795061A3-2B93-41B7-8CB3-D2EA827D06F1}" presName="rootText" presStyleLbl="node4" presStyleIdx="2" presStyleCnt="3">
         <dgm:presLayoutVars>
           <dgm:chPref val="3"/>
         </dgm:presLayoutVars>
@@ -6561,7 +6628,7 @@
       <dgm:spPr/>
     </dgm:pt>
     <dgm:pt modelId="{C7F27BC3-5AB8-4622-AF5C-3EB051AAC30B}" type="pres">
-      <dgm:prSet presAssocID="{795061A3-2B93-41B7-8CB3-D2EA827D06F1}" presName="rootConnector" presStyleLbl="node4" presStyleIdx="1" presStyleCnt="2"/>
+      <dgm:prSet presAssocID="{795061A3-2B93-41B7-8CB3-D2EA827D06F1}" presName="rootConnector" presStyleLbl="node4" presStyleIdx="2" presStyleCnt="3"/>
       <dgm:spPr/>
     </dgm:pt>
     <dgm:pt modelId="{CCCB479C-9C08-4DDB-9FCF-C3E1A0D9351A}" type="pres">
@@ -6840,6 +6907,7 @@
   <dgm:cxnLst>
     <dgm:cxn modelId="{EFA58200-CE23-4613-8A02-E644F4DC83D0}" type="presOf" srcId="{10948DB9-C87A-4CB4-AA25-2159E53038FA}" destId="{022775FB-6EEC-479D-926F-56A4BDEAF1D1}" srcOrd="1" destOrd="0" presId="urn:microsoft.com/office/officeart/2009/3/layout/HorizontalOrganizationChart"/>
     <dgm:cxn modelId="{77CE7603-DFFF-41EE-ADDB-2B6F8DB8058C}" type="presOf" srcId="{341C93D3-8A95-4DFB-AA9D-C38CA282C9E7}" destId="{51976BDE-E76E-4333-9C70-CDE9D5A040E7}" srcOrd="0" destOrd="0" presId="urn:microsoft.com/office/officeart/2009/3/layout/HorizontalOrganizationChart"/>
+    <dgm:cxn modelId="{0B0EC007-2127-4A7B-AB55-566444FFAF84}" type="presOf" srcId="{32AFFDE6-F396-4895-94C1-B7B6E7D93CDA}" destId="{2922A1E1-45E7-4B20-BC89-6A69AD9E22F9}" srcOrd="0" destOrd="0" presId="urn:microsoft.com/office/officeart/2009/3/layout/HorizontalOrganizationChart"/>
     <dgm:cxn modelId="{6EA7A90B-6204-4ABB-ADC3-5F5E5EC884AA}" type="presOf" srcId="{332EBDA1-FC91-42DD-8C1E-2C7B445019B3}" destId="{A9B67C11-509F-4F8A-8F9C-7E076BDA0F94}" srcOrd="1" destOrd="0" presId="urn:microsoft.com/office/officeart/2009/3/layout/HorizontalOrganizationChart"/>
     <dgm:cxn modelId="{8FEC920D-1544-4F78-B84D-5996A1B4BA22}" type="presOf" srcId="{10F04DDC-9425-470F-8153-E7CB032EC473}" destId="{A8510BB4-6AB4-4C7C-8DE1-2E6D90AB0CBB}" srcOrd="1" destOrd="0" presId="urn:microsoft.com/office/officeart/2009/3/layout/HorizontalOrganizationChart"/>
     <dgm:cxn modelId="{D758B211-8DAD-40BC-94C3-DDBE39349710}" type="presOf" srcId="{423859FD-096E-4927-9390-25344E903FBF}" destId="{54886875-7235-4762-AA2E-82B15FFCB5F9}" srcOrd="0" destOrd="0" presId="urn:microsoft.com/office/officeart/2009/3/layout/HorizontalOrganizationChart"/>
@@ -6862,6 +6930,7 @@
     <dgm:cxn modelId="{AAB6AF41-2264-4F2D-B4A2-D749F7CCD617}" type="presOf" srcId="{57A8CB2D-79BE-4C74-9A37-D6A913DE1B82}" destId="{F96B956B-5837-4962-AA1E-51181F232425}" srcOrd="0" destOrd="0" presId="urn:microsoft.com/office/officeart/2009/3/layout/HorizontalOrganizationChart"/>
     <dgm:cxn modelId="{4091E661-0EEF-408D-BF24-558628C0A4F1}" type="presOf" srcId="{332EBDA1-FC91-42DD-8C1E-2C7B445019B3}" destId="{0D631D49-DE9D-4792-9A6C-A983781D0868}" srcOrd="0" destOrd="0" presId="urn:microsoft.com/office/officeart/2009/3/layout/HorizontalOrganizationChart"/>
     <dgm:cxn modelId="{E3BB8A62-A08B-4A8C-9496-BC555FE1CCFC}" type="presOf" srcId="{7CF047C5-7A21-4DCA-910B-CBEC1AA93BA9}" destId="{2E53B9A6-410F-49A9-951C-6B6DC53931B0}" srcOrd="0" destOrd="0" presId="urn:microsoft.com/office/officeart/2009/3/layout/HorizontalOrganizationChart"/>
+    <dgm:cxn modelId="{22E51B43-4873-4145-B074-D61FB32C82CC}" type="presOf" srcId="{6FF99DC2-0BA1-48DA-AAF4-D1699CD7A605}" destId="{D6E0FA02-0214-49B6-9B94-783FCE0C0294}" srcOrd="0" destOrd="0" presId="urn:microsoft.com/office/officeart/2009/3/layout/HorizontalOrganizationChart"/>
     <dgm:cxn modelId="{E85F6D65-1590-42CE-95F6-89BF65969C23}" type="presOf" srcId="{42168C56-2F22-4C47-AD41-80714FFDE7B7}" destId="{CB5056A5-2DD9-4A9F-8293-EE12A55AF83F}" srcOrd="0" destOrd="0" presId="urn:microsoft.com/office/officeart/2009/3/layout/HorizontalOrganizationChart"/>
     <dgm:cxn modelId="{A4C29145-D932-44D5-B71C-B9F54857DF5C}" type="presOf" srcId="{197668C4-8212-48B8-A54E-73002176A9B9}" destId="{5A414EAD-06E0-4406-B805-5E2104B3D0DD}" srcOrd="0" destOrd="0" presId="urn:microsoft.com/office/officeart/2009/3/layout/HorizontalOrganizationChart"/>
     <dgm:cxn modelId="{DDE17066-BD6F-42AB-812B-37DCBD8B4778}" type="presOf" srcId="{5DF6C11B-377F-47FB-BC50-A7E3E32B7B43}" destId="{7FB98923-33F3-4B6E-A104-716FC1B85402}" srcOrd="1" destOrd="0" presId="urn:microsoft.com/office/officeart/2009/3/layout/HorizontalOrganizationChart"/>
@@ -6879,6 +6948,7 @@
     <dgm:cxn modelId="{E941B051-EEEC-46F2-9423-C3A9C5537291}" type="presOf" srcId="{BF467FF0-55CD-4BEF-AE62-398B1B3BB0CF}" destId="{B534A36E-F9EC-4311-B1DF-EA82917C6F6D}" srcOrd="0" destOrd="0" presId="urn:microsoft.com/office/officeart/2009/3/layout/HorizontalOrganizationChart"/>
     <dgm:cxn modelId="{5DF6B753-8AEC-45B1-812D-CBEF4E665B5B}" srcId="{1924ECD5-AA0E-4B54-9424-D53165043932}" destId="{A1C6BA05-AD07-4670-B0CD-118E17FA1993}" srcOrd="2" destOrd="0" parTransId="{423859FD-096E-4927-9390-25344E903FBF}" sibTransId="{249108A4-E90A-45F0-91DE-62B0931DD375}"/>
     <dgm:cxn modelId="{8B4ED373-BD51-4FBE-8FAC-786BC92F491F}" type="presOf" srcId="{967C17FD-B87B-4CD0-BD44-345E2E5D2EA3}" destId="{DDB737D1-B170-410E-B636-D69C244AB233}" srcOrd="0" destOrd="0" presId="urn:microsoft.com/office/officeart/2009/3/layout/HorizontalOrganizationChart"/>
+    <dgm:cxn modelId="{DC582C74-DEDE-408E-819C-A1CB816729C6}" srcId="{F592A012-32A7-4C82-BF4D-CA3D12AD7C92}" destId="{6FF99DC2-0BA1-48DA-AAF4-D1699CD7A605}" srcOrd="0" destOrd="0" parTransId="{32AFFDE6-F396-4895-94C1-B7B6E7D93CDA}" sibTransId="{965B4A1B-C877-42F3-8B70-81F0D1B5EEA9}"/>
     <dgm:cxn modelId="{F812C254-ECB2-457A-B2DD-0DA61683069B}" srcId="{1924ECD5-AA0E-4B54-9424-D53165043932}" destId="{DE023E0B-5C31-4E35-A101-3DA3908C072F}" srcOrd="4" destOrd="0" parTransId="{967C17FD-B87B-4CD0-BD44-345E2E5D2EA3}" sibTransId="{8A9ACAAE-236A-4C50-8D2E-022C95250F55}"/>
     <dgm:cxn modelId="{27713575-935A-4D82-9AAC-B46572C6BD8C}" type="presOf" srcId="{D7009F5C-9656-4E9C-B269-B880E0F0CD6C}" destId="{A0E3F985-7D62-429C-AFD8-779DCB4495E1}" srcOrd="1" destOrd="0" presId="urn:microsoft.com/office/officeart/2009/3/layout/HorizontalOrganizationChart"/>
     <dgm:cxn modelId="{AD01F376-05D2-4E08-AE97-8BC43D097BAA}" type="presOf" srcId="{1924ECD5-AA0E-4B54-9424-D53165043932}" destId="{113FE10A-F086-4E22-A831-70FC6DC86A8B}" srcOrd="1" destOrd="0" presId="urn:microsoft.com/office/officeart/2009/3/layout/HorizontalOrganizationChart"/>
@@ -6926,6 +6996,7 @@
     <dgm:cxn modelId="{09FEB7B7-BCCA-4ED6-8BE2-889652152D0D}" srcId="{98DE5844-EBFB-4ECB-843E-1E3C116CD0A7}" destId="{332EBDA1-FC91-42DD-8C1E-2C7B445019B3}" srcOrd="0" destOrd="0" parTransId="{0E41C96E-49F8-4F4A-AF74-A981293F785F}" sibTransId="{6F50CEDF-F26E-458C-ABDC-9725FAFC71B9}"/>
     <dgm:cxn modelId="{D8EB9AB8-65B5-4F00-97D6-AC77A68B62FE}" srcId="{D7009F5C-9656-4E9C-B269-B880E0F0CD6C}" destId="{028C5DFA-CD08-425A-9808-BE49C21D580B}" srcOrd="0" destOrd="0" parTransId="{E8EB6F71-72ED-410E-A6D6-688CC4C8622F}" sibTransId="{EC8C1563-BCBD-4458-A64C-29451454356E}"/>
     <dgm:cxn modelId="{AE64B9B9-7C21-46ED-BA79-9C3504CD8E9F}" type="presOf" srcId="{3C6EA423-D64F-4DC7-B184-24C9BC3512E8}" destId="{1F365EA9-8A2A-4AC9-B613-127193CA87A7}" srcOrd="1" destOrd="0" presId="urn:microsoft.com/office/officeart/2009/3/layout/HorizontalOrganizationChart"/>
+    <dgm:cxn modelId="{8E8A43BB-7DAA-45A3-A65F-B8C75EBA3526}" type="presOf" srcId="{6FF99DC2-0BA1-48DA-AAF4-D1699CD7A605}" destId="{AA76DA7D-3B97-4800-983B-B2B5F5E3A8EF}" srcOrd="1" destOrd="0" presId="urn:microsoft.com/office/officeart/2009/3/layout/HorizontalOrganizationChart"/>
     <dgm:cxn modelId="{75CFDEBE-8576-45F1-8179-E2BF3C26238A}" type="presOf" srcId="{347BA63F-6330-4E17-9091-C819304D8374}" destId="{2A2867CB-CA48-4D15-BDD1-AEE4D30C5C71}" srcOrd="0" destOrd="0" presId="urn:microsoft.com/office/officeart/2009/3/layout/HorizontalOrganizationChart"/>
     <dgm:cxn modelId="{8BAE4CC5-8E15-4C6D-820C-986EBEF1F953}" type="presOf" srcId="{347BA63F-6330-4E17-9091-C819304D8374}" destId="{2E3E037F-66A4-4E32-88C9-13723390D309}" srcOrd="1" destOrd="0" presId="urn:microsoft.com/office/officeart/2009/3/layout/HorizontalOrganizationChart"/>
     <dgm:cxn modelId="{83B220C9-575D-4410-9866-5F5B448BA45A}" srcId="{441C9BFF-8AD7-4827-90F5-60BEDCAF3705}" destId="{98DE5844-EBFB-4ECB-843E-1E3C116CD0A7}" srcOrd="1" destOrd="0" parTransId="{B829E806-E11E-4BDA-8589-5EF437FD4FD6}" sibTransId="{964986D0-5530-46C8-8F61-2A4F7C778AD2}"/>
@@ -7083,6 +7154,13 @@
     <dgm:cxn modelId="{4C8E31B1-B972-4BAF-BFB0-DAC811C54ADB}" type="presParOf" srcId="{C35DE3DC-32EC-43B2-8A5C-C83EFBB7BA2B}" destId="{CC81E544-050C-42F2-9A23-930845DEEF2C}" srcOrd="0" destOrd="0" presId="urn:microsoft.com/office/officeart/2009/3/layout/HorizontalOrganizationChart"/>
     <dgm:cxn modelId="{24ACC009-8C66-475D-9EF7-DFDA7E70B033}" type="presParOf" srcId="{C35DE3DC-32EC-43B2-8A5C-C83EFBB7BA2B}" destId="{9BA74907-CC52-4A3D-BECF-252907E38BF8}" srcOrd="1" destOrd="0" presId="urn:microsoft.com/office/officeart/2009/3/layout/HorizontalOrganizationChart"/>
     <dgm:cxn modelId="{D8BA90E8-9ECA-4063-95B6-0E33695E54C2}" type="presParOf" srcId="{CC7F2A4B-C83E-4F6E-B446-0618D0BE64EB}" destId="{A72D9BE7-D00E-40E0-9CE9-9AB7358508D0}" srcOrd="1" destOrd="0" presId="urn:microsoft.com/office/officeart/2009/3/layout/HorizontalOrganizationChart"/>
+    <dgm:cxn modelId="{460B5824-B1A1-421B-A73E-3CC6D436BDF4}" type="presParOf" srcId="{A72D9BE7-D00E-40E0-9CE9-9AB7358508D0}" destId="{2922A1E1-45E7-4B20-BC89-6A69AD9E22F9}" srcOrd="0" destOrd="0" presId="urn:microsoft.com/office/officeart/2009/3/layout/HorizontalOrganizationChart"/>
+    <dgm:cxn modelId="{C6C22812-2EB6-4A56-B0B1-24760E4F0C4F}" type="presParOf" srcId="{A72D9BE7-D00E-40E0-9CE9-9AB7358508D0}" destId="{537DCF6A-9367-4FD7-9A35-8604FB688617}" srcOrd="1" destOrd="0" presId="urn:microsoft.com/office/officeart/2009/3/layout/HorizontalOrganizationChart"/>
+    <dgm:cxn modelId="{BA68946A-4793-4B5F-88E4-E5F09D72EB90}" type="presParOf" srcId="{537DCF6A-9367-4FD7-9A35-8604FB688617}" destId="{8F72091C-B690-4551-8620-C9EE79780856}" srcOrd="0" destOrd="0" presId="urn:microsoft.com/office/officeart/2009/3/layout/HorizontalOrganizationChart"/>
+    <dgm:cxn modelId="{E5327506-8523-464F-8800-6BDAAC51A57C}" type="presParOf" srcId="{8F72091C-B690-4551-8620-C9EE79780856}" destId="{D6E0FA02-0214-49B6-9B94-783FCE0C0294}" srcOrd="0" destOrd="0" presId="urn:microsoft.com/office/officeart/2009/3/layout/HorizontalOrganizationChart"/>
+    <dgm:cxn modelId="{4F037271-FFC8-4DFE-9E9D-8476D3E8C32E}" type="presParOf" srcId="{8F72091C-B690-4551-8620-C9EE79780856}" destId="{AA76DA7D-3B97-4800-983B-B2B5F5E3A8EF}" srcOrd="1" destOrd="0" presId="urn:microsoft.com/office/officeart/2009/3/layout/HorizontalOrganizationChart"/>
+    <dgm:cxn modelId="{F3E9DDE0-5903-4EB8-B978-4641F4DF6AE0}" type="presParOf" srcId="{537DCF6A-9367-4FD7-9A35-8604FB688617}" destId="{7AD1CA69-F91F-4788-A91F-925FBCF70B86}" srcOrd="1" destOrd="0" presId="urn:microsoft.com/office/officeart/2009/3/layout/HorizontalOrganizationChart"/>
+    <dgm:cxn modelId="{316DE204-583B-437C-B39D-4BC6F536F3ED}" type="presParOf" srcId="{537DCF6A-9367-4FD7-9A35-8604FB688617}" destId="{95D16504-E3FD-42AB-BA2A-0D771DC1020E}" srcOrd="2" destOrd="0" presId="urn:microsoft.com/office/officeart/2009/3/layout/HorizontalOrganizationChart"/>
     <dgm:cxn modelId="{599B96C9-92F1-4F31-82BE-12FC470D5B31}" type="presParOf" srcId="{CC7F2A4B-C83E-4F6E-B446-0618D0BE64EB}" destId="{99FBEC27-E6A0-4C3F-B74E-C8F2D217826C}" srcOrd="2" destOrd="0" presId="urn:microsoft.com/office/officeart/2009/3/layout/HorizontalOrganizationChart"/>
     <dgm:cxn modelId="{03C3D6A5-1C4B-4D41-BF26-79CDD8378AE6}" type="presParOf" srcId="{17A3315F-888D-4773-8E1D-F85FAF6DC68C}" destId="{CB5056A5-2DD9-4A9F-8293-EE12A55AF83F}" srcOrd="2" destOrd="0" presId="urn:microsoft.com/office/officeart/2009/3/layout/HorizontalOrganizationChart"/>
     <dgm:cxn modelId="{7EECA405-F7B2-4C3E-8048-00819E8A1E47}" type="presParOf" srcId="{17A3315F-888D-4773-8E1D-F85FAF6DC68C}" destId="{7BEE19CE-A9CD-4FA6-8CB7-CF65AEAFD2AB}" srcOrd="3" destOrd="0" presId="urn:microsoft.com/office/officeart/2009/3/layout/HorizontalOrganizationChart"/>
@@ -10526,7 +10604,7 @@
       </dsp:nvSpPr>
       <dsp:spPr>
         <a:xfrm>
-          <a:off x="2828987" y="8585476"/>
+          <a:off x="2828987" y="8723641"/>
           <a:ext cx="257049" cy="91440"/>
         </a:xfrm>
         <a:custGeom>
@@ -10583,7 +10661,7 @@
       <dsp:spPr>
         <a:xfrm>
           <a:off x="1286691" y="4486275"/>
-          <a:ext cx="257049" cy="4144921"/>
+          <a:ext cx="257049" cy="4283086"/>
         </a:xfrm>
         <a:custGeom>
           <a:avLst/>
@@ -10600,10 +10678,10 @@
                 <a:pt x="128524" y="0"/>
               </a:lnTo>
               <a:lnTo>
-                <a:pt x="128524" y="4144921"/>
+                <a:pt x="128524" y="4283086"/>
               </a:lnTo>
               <a:lnTo>
-                <a:pt x="257049" y="4144921"/>
+                <a:pt x="257049" y="4283086"/>
               </a:lnTo>
             </a:path>
           </a:pathLst>
@@ -10644,7 +10722,7 @@
       </dsp:nvSpPr>
       <dsp:spPr>
         <a:xfrm>
-          <a:off x="2828987" y="7802212"/>
+          <a:off x="2828987" y="7940376"/>
           <a:ext cx="257049" cy="276328"/>
         </a:xfrm>
         <a:custGeom>
@@ -10706,7 +10784,7 @@
       </dsp:nvSpPr>
       <dsp:spPr>
         <a:xfrm>
-          <a:off x="2828987" y="7525884"/>
+          <a:off x="2828987" y="7664048"/>
           <a:ext cx="257049" cy="276328"/>
         </a:xfrm>
         <a:custGeom>
@@ -10769,7 +10847,7 @@
       <dsp:spPr>
         <a:xfrm>
           <a:off x="1286691" y="4486275"/>
-          <a:ext cx="257049" cy="3315937"/>
+          <a:ext cx="257049" cy="3454101"/>
         </a:xfrm>
         <a:custGeom>
           <a:avLst/>
@@ -10786,10 +10864,10 @@
                 <a:pt x="128524" y="0"/>
               </a:lnTo>
               <a:lnTo>
-                <a:pt x="128524" y="3315937"/>
+                <a:pt x="128524" y="3454101"/>
               </a:lnTo>
               <a:lnTo>
-                <a:pt x="257049" y="3315937"/>
+                <a:pt x="257049" y="3454101"/>
               </a:lnTo>
             </a:path>
           </a:pathLst>
@@ -10830,7 +10908,7 @@
       </dsp:nvSpPr>
       <dsp:spPr>
         <a:xfrm>
-          <a:off x="2828987" y="6927508"/>
+          <a:off x="2828987" y="7065672"/>
           <a:ext cx="257049" cy="91440"/>
         </a:xfrm>
         <a:custGeom>
@@ -10887,7 +10965,7 @@
       <dsp:spPr>
         <a:xfrm>
           <a:off x="1286691" y="4486275"/>
-          <a:ext cx="257049" cy="2486953"/>
+          <a:ext cx="257049" cy="2625117"/>
         </a:xfrm>
         <a:custGeom>
           <a:avLst/>
@@ -10904,10 +10982,10 @@
                 <a:pt x="128524" y="0"/>
               </a:lnTo>
               <a:lnTo>
-                <a:pt x="128524" y="2486953"/>
+                <a:pt x="128524" y="2625117"/>
               </a:lnTo>
               <a:lnTo>
-                <a:pt x="257049" y="2486953"/>
+                <a:pt x="257049" y="2625117"/>
               </a:lnTo>
             </a:path>
           </a:pathLst>
@@ -10948,7 +11026,7 @@
       </dsp:nvSpPr>
       <dsp:spPr>
         <a:xfrm>
-          <a:off x="4371284" y="6420571"/>
+          <a:off x="4371284" y="6558735"/>
           <a:ext cx="257049" cy="276328"/>
         </a:xfrm>
         <a:custGeom>
@@ -11010,7 +11088,7 @@
       </dsp:nvSpPr>
       <dsp:spPr>
         <a:xfrm>
-          <a:off x="4371284" y="6144243"/>
+          <a:off x="4371284" y="6282407"/>
           <a:ext cx="257049" cy="276328"/>
         </a:xfrm>
         <a:custGeom>
@@ -11073,7 +11151,7 @@
       <dsp:spPr>
         <a:xfrm>
           <a:off x="2828987" y="6144243"/>
-          <a:ext cx="257049" cy="276328"/>
+          <a:ext cx="257049" cy="414492"/>
         </a:xfrm>
         <a:custGeom>
           <a:avLst/>
@@ -11090,10 +11168,10 @@
                 <a:pt x="128524" y="0"/>
               </a:lnTo>
               <a:lnTo>
-                <a:pt x="128524" y="276328"/>
+                <a:pt x="128524" y="414492"/>
               </a:lnTo>
               <a:lnTo>
-                <a:pt x="257049" y="276328"/>
+                <a:pt x="257049" y="414492"/>
               </a:lnTo>
             </a:path>
           </a:pathLst>
@@ -11127,15 +11205,15 @@
         <a:fontRef idx="minor"/>
       </dsp:style>
     </dsp:sp>
-    <dsp:sp modelId="{57FCA201-C372-42EC-BE6F-AA451AC42FF2}">
+    <dsp:sp modelId="{2922A1E1-45E7-4B20-BC89-6A69AD9E22F9}">
       <dsp:nvSpPr>
         <dsp:cNvPr id="0" name=""/>
         <dsp:cNvSpPr/>
       </dsp:nvSpPr>
       <dsp:spPr>
         <a:xfrm>
-          <a:off x="2828987" y="5867915"/>
-          <a:ext cx="257049" cy="276328"/>
+          <a:off x="4371284" y="5684031"/>
+          <a:ext cx="257049" cy="91440"/>
         </a:xfrm>
         <a:custGeom>
           <a:avLst/>
@@ -11146,10 +11224,66 @@
           <a:pathLst>
             <a:path>
               <a:moveTo>
-                <a:pt x="0" y="276328"/>
+                <a:pt x="0" y="45720"/>
               </a:moveTo>
               <a:lnTo>
-                <a:pt x="128524" y="276328"/>
+                <a:pt x="257049" y="45720"/>
+              </a:lnTo>
+            </a:path>
+          </a:pathLst>
+        </a:custGeom>
+        <a:noFill/>
+        <a:ln w="12700" cap="flat" cmpd="sng" algn="ctr">
+          <a:solidFill>
+            <a:schemeClr val="dk1">
+              <a:shade val="80000"/>
+              <a:hueOff val="0"/>
+              <a:satOff val="0"/>
+              <a:lumOff val="0"/>
+              <a:alphaOff val="0"/>
+            </a:schemeClr>
+          </a:solidFill>
+          <a:prstDash val="solid"/>
+          <a:miter lim="800000"/>
+        </a:ln>
+        <a:effectLst/>
+      </dsp:spPr>
+      <dsp:style>
+        <a:lnRef idx="2">
+          <a:scrgbClr r="0" g="0" b="0"/>
+        </a:lnRef>
+        <a:fillRef idx="0">
+          <a:scrgbClr r="0" g="0" b="0"/>
+        </a:fillRef>
+        <a:effectRef idx="0">
+          <a:scrgbClr r="0" g="0" b="0"/>
+        </a:effectRef>
+        <a:fontRef idx="minor"/>
+      </dsp:style>
+    </dsp:sp>
+    <dsp:sp modelId="{57FCA201-C372-42EC-BE6F-AA451AC42FF2}">
+      <dsp:nvSpPr>
+        <dsp:cNvPr id="0" name=""/>
+        <dsp:cNvSpPr/>
+      </dsp:nvSpPr>
+      <dsp:spPr>
+        <a:xfrm>
+          <a:off x="2828987" y="5729751"/>
+          <a:ext cx="257049" cy="414492"/>
+        </a:xfrm>
+        <a:custGeom>
+          <a:avLst/>
+          <a:gdLst/>
+          <a:ahLst/>
+          <a:cxnLst/>
+          <a:rect l="0" t="0" r="0" b="0"/>
+          <a:pathLst>
+            <a:path>
+              <a:moveTo>
+                <a:pt x="0" y="414492"/>
+              </a:moveTo>
+              <a:lnTo>
+                <a:pt x="128524" y="414492"/>
               </a:lnTo>
               <a:lnTo>
                 <a:pt x="128524" y="0"/>
@@ -11258,7 +11392,7 @@
       </dsp:nvSpPr>
       <dsp:spPr>
         <a:xfrm>
-          <a:off x="2828987" y="5269539"/>
+          <a:off x="2828987" y="5131375"/>
           <a:ext cx="257049" cy="91440"/>
         </a:xfrm>
         <a:custGeom>
@@ -11315,7 +11449,7 @@
       <dsp:spPr>
         <a:xfrm>
           <a:off x="1286691" y="4486275"/>
-          <a:ext cx="257049" cy="828984"/>
+          <a:ext cx="257049" cy="690820"/>
         </a:xfrm>
         <a:custGeom>
           <a:avLst/>
@@ -11332,10 +11466,10 @@
                 <a:pt x="128524" y="0"/>
               </a:lnTo>
               <a:lnTo>
-                <a:pt x="128524" y="828984"/>
+                <a:pt x="128524" y="690820"/>
               </a:lnTo>
               <a:lnTo>
-                <a:pt x="257049" y="828984"/>
+                <a:pt x="257049" y="690820"/>
               </a:lnTo>
             </a:path>
           </a:pathLst>
@@ -11376,7 +11510,7 @@
       </dsp:nvSpPr>
       <dsp:spPr>
         <a:xfrm>
-          <a:off x="2828987" y="3104634"/>
+          <a:off x="2828987" y="2966470"/>
           <a:ext cx="257049" cy="1657968"/>
         </a:xfrm>
         <a:custGeom>
@@ -11438,7 +11572,7 @@
       </dsp:nvSpPr>
       <dsp:spPr>
         <a:xfrm>
-          <a:off x="2828987" y="3104634"/>
+          <a:off x="2828987" y="2966470"/>
           <a:ext cx="257049" cy="1105312"/>
         </a:xfrm>
         <a:custGeom>
@@ -11500,7 +11634,7 @@
       </dsp:nvSpPr>
       <dsp:spPr>
         <a:xfrm>
-          <a:off x="2828987" y="3104634"/>
+          <a:off x="2828987" y="2966470"/>
           <a:ext cx="257049" cy="552656"/>
         </a:xfrm>
         <a:custGeom>
@@ -11562,7 +11696,7 @@
       </dsp:nvSpPr>
       <dsp:spPr>
         <a:xfrm>
-          <a:off x="2828987" y="3058914"/>
+          <a:off x="2828987" y="2920750"/>
           <a:ext cx="257049" cy="91440"/>
         </a:xfrm>
         <a:custGeom>
@@ -11618,7 +11752,7 @@
       </dsp:nvSpPr>
       <dsp:spPr>
         <a:xfrm>
-          <a:off x="2828987" y="2551978"/>
+          <a:off x="2828987" y="2413814"/>
           <a:ext cx="257049" cy="552656"/>
         </a:xfrm>
         <a:custGeom>
@@ -11680,7 +11814,7 @@
       </dsp:nvSpPr>
       <dsp:spPr>
         <a:xfrm>
-          <a:off x="2828987" y="1999321"/>
+          <a:off x="2828987" y="1861157"/>
           <a:ext cx="257049" cy="1105312"/>
         </a:xfrm>
         <a:custGeom>
@@ -11742,7 +11876,7 @@
       </dsp:nvSpPr>
       <dsp:spPr>
         <a:xfrm>
-          <a:off x="2828987" y="1446665"/>
+          <a:off x="2828987" y="1308501"/>
           <a:ext cx="257049" cy="1657968"/>
         </a:xfrm>
         <a:custGeom>
@@ -11804,8 +11938,8 @@
       </dsp:nvSpPr>
       <dsp:spPr>
         <a:xfrm>
-          <a:off x="1286691" y="3104634"/>
-          <a:ext cx="257049" cy="1381640"/>
+          <a:off x="1286691" y="2966470"/>
+          <a:ext cx="257049" cy="1519804"/>
         </a:xfrm>
         <a:custGeom>
           <a:avLst/>
@@ -11816,10 +11950,10 @@
           <a:pathLst>
             <a:path>
               <a:moveTo>
-                <a:pt x="0" y="1381640"/>
+                <a:pt x="0" y="1519804"/>
               </a:moveTo>
               <a:lnTo>
-                <a:pt x="128524" y="1381640"/>
+                <a:pt x="128524" y="1519804"/>
               </a:lnTo>
               <a:lnTo>
                 <a:pt x="128524" y="0"/>
@@ -11866,8 +12000,8 @@
       </dsp:nvSpPr>
       <dsp:spPr>
         <a:xfrm>
-          <a:off x="1286691" y="1999321"/>
-          <a:ext cx="257049" cy="2486953"/>
+          <a:off x="1286691" y="1861157"/>
+          <a:ext cx="257049" cy="2625117"/>
         </a:xfrm>
         <a:custGeom>
           <a:avLst/>
@@ -11878,10 +12012,10 @@
           <a:pathLst>
             <a:path>
               <a:moveTo>
-                <a:pt x="0" y="2486953"/>
+                <a:pt x="0" y="2625117"/>
               </a:moveTo>
               <a:lnTo>
-                <a:pt x="128524" y="2486953"/>
+                <a:pt x="128524" y="2625117"/>
               </a:lnTo>
               <a:lnTo>
                 <a:pt x="128524" y="0"/>
@@ -11928,8 +12062,8 @@
       </dsp:nvSpPr>
       <dsp:spPr>
         <a:xfrm>
-          <a:off x="1286691" y="1446665"/>
-          <a:ext cx="257049" cy="3039609"/>
+          <a:off x="1286691" y="1308501"/>
+          <a:ext cx="257049" cy="3177773"/>
         </a:xfrm>
         <a:custGeom>
           <a:avLst/>
@@ -11940,10 +12074,10 @@
           <a:pathLst>
             <a:path>
               <a:moveTo>
-                <a:pt x="0" y="3039609"/>
+                <a:pt x="0" y="3177773"/>
               </a:moveTo>
               <a:lnTo>
-                <a:pt x="128524" y="3039609"/>
+                <a:pt x="128524" y="3177773"/>
               </a:lnTo>
               <a:lnTo>
                 <a:pt x="128524" y="0"/>
@@ -11990,7 +12124,7 @@
       </dsp:nvSpPr>
       <dsp:spPr>
         <a:xfrm>
-          <a:off x="2828987" y="848289"/>
+          <a:off x="2828987" y="710125"/>
           <a:ext cx="257049" cy="91440"/>
         </a:xfrm>
         <a:custGeom>
@@ -12046,8 +12180,8 @@
       </dsp:nvSpPr>
       <dsp:spPr>
         <a:xfrm>
-          <a:off x="1286691" y="894009"/>
-          <a:ext cx="257049" cy="3592265"/>
+          <a:off x="1286691" y="755845"/>
+          <a:ext cx="257049" cy="3730429"/>
         </a:xfrm>
         <a:custGeom>
           <a:avLst/>
@@ -12058,10 +12192,10 @@
           <a:pathLst>
             <a:path>
               <a:moveTo>
-                <a:pt x="0" y="3592265"/>
+                <a:pt x="0" y="3730429"/>
               </a:moveTo>
               <a:lnTo>
-                <a:pt x="128524" y="3592265"/>
+                <a:pt x="128524" y="3730429"/>
               </a:lnTo>
               <a:lnTo>
                 <a:pt x="128524" y="0"/>
@@ -12108,7 +12242,7 @@
       </dsp:nvSpPr>
       <dsp:spPr>
         <a:xfrm>
-          <a:off x="2828987" y="295633"/>
+          <a:off x="2828987" y="157468"/>
           <a:ext cx="257049" cy="91440"/>
         </a:xfrm>
         <a:custGeom>
@@ -12164,8 +12298,8 @@
       </dsp:nvSpPr>
       <dsp:spPr>
         <a:xfrm>
-          <a:off x="1286691" y="341353"/>
-          <a:ext cx="257049" cy="4144921"/>
+          <a:off x="1286691" y="203188"/>
+          <a:ext cx="257049" cy="4283086"/>
         </a:xfrm>
         <a:custGeom>
           <a:avLst/>
@@ -12176,10 +12310,10 @@
           <a:pathLst>
             <a:path>
               <a:moveTo>
-                <a:pt x="0" y="4144921"/>
+                <a:pt x="0" y="4283086"/>
               </a:moveTo>
               <a:lnTo>
-                <a:pt x="128524" y="4144921"/>
+                <a:pt x="128524" y="4283086"/>
               </a:lnTo>
               <a:lnTo>
                 <a:pt x="128524" y="0"/>
@@ -12305,7 +12439,7 @@
       </dsp:nvSpPr>
       <dsp:spPr>
         <a:xfrm>
-          <a:off x="1543740" y="145352"/>
+          <a:off x="1543740" y="7188"/>
           <a:ext cx="1285247" cy="392000"/>
         </a:xfrm>
         <a:prstGeom prst="rect">
@@ -12373,7 +12507,7 @@
         </a:p>
       </dsp:txBody>
       <dsp:txXfrm>
-        <a:off x="1543740" y="145352"/>
+        <a:off x="1543740" y="7188"/>
         <a:ext cx="1285247" cy="392000"/>
       </dsp:txXfrm>
     </dsp:sp>
@@ -12384,7 +12518,7 @@
       </dsp:nvSpPr>
       <dsp:spPr>
         <a:xfrm>
-          <a:off x="3086037" y="145352"/>
+          <a:off x="3086037" y="7188"/>
           <a:ext cx="1285247" cy="392000"/>
         </a:xfrm>
         <a:prstGeom prst="rect">
@@ -12452,7 +12586,7 @@
         </a:p>
       </dsp:txBody>
       <dsp:txXfrm>
-        <a:off x="3086037" y="145352"/>
+        <a:off x="3086037" y="7188"/>
         <a:ext cx="1285247" cy="392000"/>
       </dsp:txXfrm>
     </dsp:sp>
@@ -12463,7 +12597,7 @@
       </dsp:nvSpPr>
       <dsp:spPr>
         <a:xfrm>
-          <a:off x="1543740" y="698009"/>
+          <a:off x="1543740" y="559845"/>
           <a:ext cx="1285247" cy="392000"/>
         </a:xfrm>
         <a:prstGeom prst="rect">
@@ -12531,7 +12665,7 @@
         </a:p>
       </dsp:txBody>
       <dsp:txXfrm>
-        <a:off x="1543740" y="698009"/>
+        <a:off x="1543740" y="559845"/>
         <a:ext cx="1285247" cy="392000"/>
       </dsp:txXfrm>
     </dsp:sp>
@@ -12542,7 +12676,7 @@
       </dsp:nvSpPr>
       <dsp:spPr>
         <a:xfrm>
-          <a:off x="3086037" y="698009"/>
+          <a:off x="3086037" y="559845"/>
           <a:ext cx="1285247" cy="392000"/>
         </a:xfrm>
         <a:prstGeom prst="rect">
@@ -12610,7 +12744,7 @@
         </a:p>
       </dsp:txBody>
       <dsp:txXfrm>
-        <a:off x="3086037" y="698009"/>
+        <a:off x="3086037" y="559845"/>
         <a:ext cx="1285247" cy="392000"/>
       </dsp:txXfrm>
     </dsp:sp>
@@ -12621,7 +12755,7 @@
       </dsp:nvSpPr>
       <dsp:spPr>
         <a:xfrm>
-          <a:off x="1543740" y="1250665"/>
+          <a:off x="1543740" y="1112501"/>
           <a:ext cx="1285247" cy="392000"/>
         </a:xfrm>
         <a:prstGeom prst="rect">
@@ -12689,7 +12823,7 @@
         </a:p>
       </dsp:txBody>
       <dsp:txXfrm>
-        <a:off x="1543740" y="1250665"/>
+        <a:off x="1543740" y="1112501"/>
         <a:ext cx="1285247" cy="392000"/>
       </dsp:txXfrm>
     </dsp:sp>
@@ -12700,7 +12834,7 @@
       </dsp:nvSpPr>
       <dsp:spPr>
         <a:xfrm>
-          <a:off x="1543740" y="1803321"/>
+          <a:off x="1543740" y="1665157"/>
           <a:ext cx="1285247" cy="392000"/>
         </a:xfrm>
         <a:prstGeom prst="rect">
@@ -12768,7 +12902,7 @@
         </a:p>
       </dsp:txBody>
       <dsp:txXfrm>
-        <a:off x="1543740" y="1803321"/>
+        <a:off x="1543740" y="1665157"/>
         <a:ext cx="1285247" cy="392000"/>
       </dsp:txXfrm>
     </dsp:sp>
@@ -12779,7 +12913,7 @@
       </dsp:nvSpPr>
       <dsp:spPr>
         <a:xfrm>
-          <a:off x="1543740" y="2908634"/>
+          <a:off x="1543740" y="2770470"/>
           <a:ext cx="1285247" cy="392000"/>
         </a:xfrm>
         <a:prstGeom prst="rect">
@@ -12855,7 +12989,7 @@
         </a:p>
       </dsp:txBody>
       <dsp:txXfrm>
-        <a:off x="1543740" y="2908634"/>
+        <a:off x="1543740" y="2770470"/>
         <a:ext cx="1285247" cy="392000"/>
       </dsp:txXfrm>
     </dsp:sp>
@@ -12866,7 +13000,7 @@
       </dsp:nvSpPr>
       <dsp:spPr>
         <a:xfrm>
-          <a:off x="3086037" y="1250665"/>
+          <a:off x="3086037" y="1112501"/>
           <a:ext cx="1285247" cy="392000"/>
         </a:xfrm>
         <a:prstGeom prst="rect">
@@ -12942,7 +13076,7 @@
         </a:p>
       </dsp:txBody>
       <dsp:txXfrm>
-        <a:off x="3086037" y="1250665"/>
+        <a:off x="3086037" y="1112501"/>
         <a:ext cx="1285247" cy="392000"/>
       </dsp:txXfrm>
     </dsp:sp>
@@ -12953,7 +13087,7 @@
       </dsp:nvSpPr>
       <dsp:spPr>
         <a:xfrm>
-          <a:off x="3086037" y="1803321"/>
+          <a:off x="3086037" y="1665157"/>
           <a:ext cx="1285247" cy="392000"/>
         </a:xfrm>
         <a:prstGeom prst="rect">
@@ -13029,7 +13163,7 @@
         </a:p>
       </dsp:txBody>
       <dsp:txXfrm>
-        <a:off x="3086037" y="1803321"/>
+        <a:off x="3086037" y="1665157"/>
         <a:ext cx="1285247" cy="392000"/>
       </dsp:txXfrm>
     </dsp:sp>
@@ -13040,7 +13174,7 @@
       </dsp:nvSpPr>
       <dsp:spPr>
         <a:xfrm>
-          <a:off x="3086037" y="2355977"/>
+          <a:off x="3086037" y="2217813"/>
           <a:ext cx="1285247" cy="392000"/>
         </a:xfrm>
         <a:prstGeom prst="rect">
@@ -13116,7 +13250,7 @@
         </a:p>
       </dsp:txBody>
       <dsp:txXfrm>
-        <a:off x="3086037" y="2355977"/>
+        <a:off x="3086037" y="2217813"/>
         <a:ext cx="1285247" cy="392000"/>
       </dsp:txXfrm>
     </dsp:sp>
@@ -13127,7 +13261,7 @@
       </dsp:nvSpPr>
       <dsp:spPr>
         <a:xfrm>
-          <a:off x="3086037" y="2908634"/>
+          <a:off x="3086037" y="2770470"/>
           <a:ext cx="1285247" cy="392000"/>
         </a:xfrm>
         <a:prstGeom prst="rect">
@@ -13195,7 +13329,7 @@
         </a:p>
       </dsp:txBody>
       <dsp:txXfrm>
-        <a:off x="3086037" y="2908634"/>
+        <a:off x="3086037" y="2770470"/>
         <a:ext cx="1285247" cy="392000"/>
       </dsp:txXfrm>
     </dsp:sp>
@@ -13206,7 +13340,7 @@
       </dsp:nvSpPr>
       <dsp:spPr>
         <a:xfrm>
-          <a:off x="3086037" y="3461290"/>
+          <a:off x="3086037" y="3323126"/>
           <a:ext cx="1285247" cy="392000"/>
         </a:xfrm>
         <a:prstGeom prst="rect">
@@ -13274,7 +13408,7 @@
         </a:p>
       </dsp:txBody>
       <dsp:txXfrm>
-        <a:off x="3086037" y="3461290"/>
+        <a:off x="3086037" y="3323126"/>
         <a:ext cx="1285247" cy="392000"/>
       </dsp:txXfrm>
     </dsp:sp>
@@ -13285,7 +13419,7 @@
       </dsp:nvSpPr>
       <dsp:spPr>
         <a:xfrm>
-          <a:off x="3086037" y="4013946"/>
+          <a:off x="3086037" y="3875782"/>
           <a:ext cx="1285247" cy="392000"/>
         </a:xfrm>
         <a:prstGeom prst="rect">
@@ -13353,7 +13487,7 @@
         </a:p>
       </dsp:txBody>
       <dsp:txXfrm>
-        <a:off x="3086037" y="4013946"/>
+        <a:off x="3086037" y="3875782"/>
         <a:ext cx="1285247" cy="392000"/>
       </dsp:txXfrm>
     </dsp:sp>
@@ -13364,7 +13498,7 @@
       </dsp:nvSpPr>
       <dsp:spPr>
         <a:xfrm>
-          <a:off x="3086037" y="4566602"/>
+          <a:off x="3086037" y="4428438"/>
           <a:ext cx="1285247" cy="392000"/>
         </a:xfrm>
         <a:prstGeom prst="rect">
@@ -13432,7 +13566,7 @@
         </a:p>
       </dsp:txBody>
       <dsp:txXfrm>
-        <a:off x="3086037" y="4566602"/>
+        <a:off x="3086037" y="4428438"/>
         <a:ext cx="1285247" cy="392000"/>
       </dsp:txXfrm>
     </dsp:sp>
@@ -13443,7 +13577,7 @@
       </dsp:nvSpPr>
       <dsp:spPr>
         <a:xfrm>
-          <a:off x="1543740" y="5119259"/>
+          <a:off x="1543740" y="4981095"/>
           <a:ext cx="1285247" cy="392000"/>
         </a:xfrm>
         <a:prstGeom prst="rect">
@@ -13511,7 +13645,7 @@
         </a:p>
       </dsp:txBody>
       <dsp:txXfrm>
-        <a:off x="1543740" y="5119259"/>
+        <a:off x="1543740" y="4981095"/>
         <a:ext cx="1285247" cy="392000"/>
       </dsp:txXfrm>
     </dsp:sp>
@@ -13522,7 +13656,7 @@
       </dsp:nvSpPr>
       <dsp:spPr>
         <a:xfrm>
-          <a:off x="3086037" y="5119259"/>
+          <a:off x="3086037" y="4981095"/>
           <a:ext cx="1285247" cy="392000"/>
         </a:xfrm>
         <a:prstGeom prst="rect">
@@ -13590,7 +13724,7 @@
         </a:p>
       </dsp:txBody>
       <dsp:txXfrm>
-        <a:off x="3086037" y="5119259"/>
+        <a:off x="3086037" y="4981095"/>
         <a:ext cx="1285247" cy="392000"/>
       </dsp:txXfrm>
     </dsp:sp>
@@ -13680,7 +13814,7 @@
       </dsp:nvSpPr>
       <dsp:spPr>
         <a:xfrm>
-          <a:off x="3086037" y="5671915"/>
+          <a:off x="3086037" y="5533751"/>
           <a:ext cx="1285247" cy="392000"/>
         </a:xfrm>
         <a:prstGeom prst="rect">
@@ -13743,28 +13877,23 @@
           </a:pPr>
           <a:r>
             <a:rPr lang="en-PH" sz="700" i="0" u="none" kern="1200" dirty="0"/>
-            <a:t>GET: /profile</a:t>
+            <a:t>GET: /profile/&lt;search&gt;</a:t>
           </a:r>
-          <a:r>
-            <a:rPr lang="en-PH" sz="700" i="0" u="none" kern="1200"/>
-            <a:t>/search</a:t>
-          </a:r>
-          <a:endParaRPr lang="en-PH" sz="700" i="0" u="none" kern="1200" dirty="0"/>
         </a:p>
       </dsp:txBody>
       <dsp:txXfrm>
-        <a:off x="3086037" y="5671915"/>
+        <a:off x="3086037" y="5533751"/>
         <a:ext cx="1285247" cy="392000"/>
       </dsp:txXfrm>
     </dsp:sp>
-    <dsp:sp modelId="{E10FB195-6400-4935-BFBA-6C89C0AC2BE0}">
+    <dsp:sp modelId="{D6E0FA02-0214-49B6-9B94-783FCE0C0294}">
       <dsp:nvSpPr>
         <dsp:cNvPr id="0" name=""/>
         <dsp:cNvSpPr/>
       </dsp:nvSpPr>
       <dsp:spPr>
         <a:xfrm>
-          <a:off x="3086037" y="6224571"/>
+          <a:off x="4628333" y="5533751"/>
           <a:ext cx="1285247" cy="392000"/>
         </a:xfrm>
         <a:prstGeom prst="rect">
@@ -13827,23 +13956,23 @@
           </a:pPr>
           <a:r>
             <a:rPr lang="en-PH" sz="700" i="0" u="none" kern="1200" dirty="0"/>
-            <a:t>GET: /profile/settings</a:t>
+            <a:t>PUT: /profile/&lt;search&gt;/more</a:t>
           </a:r>
         </a:p>
       </dsp:txBody>
       <dsp:txXfrm>
-        <a:off x="3086037" y="6224571"/>
+        <a:off x="4628333" y="5533751"/>
         <a:ext cx="1285247" cy="392000"/>
       </dsp:txXfrm>
     </dsp:sp>
-    <dsp:sp modelId="{A063358C-0698-42F7-9923-2B9323B852DF}">
+    <dsp:sp modelId="{E10FB195-6400-4935-BFBA-6C89C0AC2BE0}">
       <dsp:nvSpPr>
         <dsp:cNvPr id="0" name=""/>
         <dsp:cNvSpPr/>
       </dsp:nvSpPr>
       <dsp:spPr>
         <a:xfrm>
-          <a:off x="4628333" y="5948243"/>
+          <a:off x="3086037" y="6362735"/>
           <a:ext cx="1285247" cy="392000"/>
         </a:xfrm>
         <a:prstGeom prst="rect">
@@ -13906,23 +14035,23 @@
           </a:pPr>
           <a:r>
             <a:rPr lang="en-PH" sz="700" i="0" u="none" kern="1200" dirty="0"/>
-            <a:t>PATCH: profile/settings/save</a:t>
+            <a:t>GET: /profile/settings</a:t>
           </a:r>
         </a:p>
       </dsp:txBody>
       <dsp:txXfrm>
-        <a:off x="4628333" y="5948243"/>
+        <a:off x="3086037" y="6362735"/>
         <a:ext cx="1285247" cy="392000"/>
       </dsp:txXfrm>
     </dsp:sp>
-    <dsp:sp modelId="{5149C0C6-E11C-4AB0-947A-FEDDB9A1B641}">
+    <dsp:sp modelId="{A063358C-0698-42F7-9923-2B9323B852DF}">
       <dsp:nvSpPr>
         <dsp:cNvPr id="0" name=""/>
         <dsp:cNvSpPr/>
       </dsp:nvSpPr>
       <dsp:spPr>
         <a:xfrm>
-          <a:off x="4628333" y="6500899"/>
+          <a:off x="4628333" y="6086407"/>
           <a:ext cx="1285247" cy="392000"/>
         </a:xfrm>
         <a:prstGeom prst="rect">
@@ -13985,23 +14114,23 @@
           </a:pPr>
           <a:r>
             <a:rPr lang="en-PH" sz="700" i="0" u="none" kern="1200" dirty="0"/>
-            <a:t>DELETE: profile/settings/delete</a:t>
+            <a:t>PATCH: profile/settings/save</a:t>
           </a:r>
         </a:p>
       </dsp:txBody>
       <dsp:txXfrm>
-        <a:off x="4628333" y="6500899"/>
+        <a:off x="4628333" y="6086407"/>
         <a:ext cx="1285247" cy="392000"/>
       </dsp:txXfrm>
     </dsp:sp>
-    <dsp:sp modelId="{03C67C4F-9566-4A9F-9740-3314E609EC66}">
+    <dsp:sp modelId="{5149C0C6-E11C-4AB0-947A-FEDDB9A1B641}">
       <dsp:nvSpPr>
         <dsp:cNvPr id="0" name=""/>
         <dsp:cNvSpPr/>
       </dsp:nvSpPr>
       <dsp:spPr>
         <a:xfrm>
-          <a:off x="1543740" y="6777228"/>
+          <a:off x="4628333" y="6639063"/>
           <a:ext cx="1285247" cy="392000"/>
         </a:xfrm>
         <a:prstGeom prst="rect">
@@ -14064,12 +14193,91 @@
           </a:pPr>
           <a:r>
             <a:rPr lang="en-PH" sz="700" i="0" u="none" kern="1200" dirty="0"/>
+            <a:t>DELETE: profile/settings/delete</a:t>
+          </a:r>
+        </a:p>
+      </dsp:txBody>
+      <dsp:txXfrm>
+        <a:off x="4628333" y="6639063"/>
+        <a:ext cx="1285247" cy="392000"/>
+      </dsp:txXfrm>
+    </dsp:sp>
+    <dsp:sp modelId="{03C67C4F-9566-4A9F-9740-3314E609EC66}">
+      <dsp:nvSpPr>
+        <dsp:cNvPr id="0" name=""/>
+        <dsp:cNvSpPr/>
+      </dsp:nvSpPr>
+      <dsp:spPr>
+        <a:xfrm>
+          <a:off x="1543740" y="6915392"/>
+          <a:ext cx="1285247" cy="392000"/>
+        </a:xfrm>
+        <a:prstGeom prst="rect">
+          <a:avLst/>
+        </a:prstGeom>
+        <a:solidFill>
+          <a:schemeClr val="lt1">
+            <a:hueOff val="0"/>
+            <a:satOff val="0"/>
+            <a:lumOff val="0"/>
+            <a:alphaOff val="0"/>
+          </a:schemeClr>
+        </a:solidFill>
+        <a:ln w="12700" cap="flat" cmpd="sng" algn="ctr">
+          <a:solidFill>
+            <a:schemeClr val="dk1">
+              <a:shade val="80000"/>
+              <a:hueOff val="0"/>
+              <a:satOff val="0"/>
+              <a:lumOff val="0"/>
+              <a:alphaOff val="0"/>
+            </a:schemeClr>
+          </a:solidFill>
+          <a:prstDash val="solid"/>
+          <a:miter lim="800000"/>
+        </a:ln>
+        <a:effectLst/>
+      </dsp:spPr>
+      <dsp:style>
+        <a:lnRef idx="2">
+          <a:scrgbClr r="0" g="0" b="0"/>
+        </a:lnRef>
+        <a:fillRef idx="1">
+          <a:scrgbClr r="0" g="0" b="0"/>
+        </a:fillRef>
+        <a:effectRef idx="0">
+          <a:scrgbClr r="0" g="0" b="0"/>
+        </a:effectRef>
+        <a:fontRef idx="minor">
+          <a:schemeClr val="lt1"/>
+        </a:fontRef>
+      </dsp:style>
+      <dsp:txBody>
+        <a:bodyPr spcFirstLastPara="0" vert="horz" wrap="square" lIns="4445" tIns="4445" rIns="4445" bIns="4445" numCol="1" spcCol="1270" anchor="ctr" anchorCtr="0">
+          <a:noAutofit/>
+        </a:bodyPr>
+        <a:lstStyle/>
+        <a:p>
+          <a:pPr marL="0" lvl="0" indent="0" algn="ctr" defTabSz="311150">
+            <a:lnSpc>
+              <a:spcPct val="90000"/>
+            </a:lnSpc>
+            <a:spcBef>
+              <a:spcPct val="0"/>
+            </a:spcBef>
+            <a:spcAft>
+              <a:spcPct val="35000"/>
+            </a:spcAft>
+            <a:buNone/>
+          </a:pPr>
+          <a:r>
+            <a:rPr lang="en-PH" sz="700" i="0" u="none" kern="1200" dirty="0"/>
             <a:t>GET: /user/&lt;username&gt;</a:t>
           </a:r>
         </a:p>
       </dsp:txBody>
       <dsp:txXfrm>
-        <a:off x="1543740" y="6777228"/>
+        <a:off x="1543740" y="6915392"/>
         <a:ext cx="1285247" cy="392000"/>
       </dsp:txXfrm>
     </dsp:sp>
@@ -14080,7 +14288,7 @@
       </dsp:nvSpPr>
       <dsp:spPr>
         <a:xfrm>
-          <a:off x="3086037" y="6777228"/>
+          <a:off x="3086037" y="6915392"/>
           <a:ext cx="1285247" cy="392000"/>
         </a:xfrm>
         <a:prstGeom prst="rect">
@@ -14156,7 +14364,7 @@
         </a:p>
       </dsp:txBody>
       <dsp:txXfrm>
-        <a:off x="3086037" y="6777228"/>
+        <a:off x="3086037" y="6915392"/>
         <a:ext cx="1285247" cy="392000"/>
       </dsp:txXfrm>
     </dsp:sp>
@@ -14167,7 +14375,7 @@
       </dsp:nvSpPr>
       <dsp:spPr>
         <a:xfrm>
-          <a:off x="1543740" y="7606212"/>
+          <a:off x="1543740" y="7744376"/>
           <a:ext cx="1285247" cy="392000"/>
         </a:xfrm>
         <a:prstGeom prst="rect">
@@ -14235,7 +14443,7 @@
         </a:p>
       </dsp:txBody>
       <dsp:txXfrm>
-        <a:off x="1543740" y="7606212"/>
+        <a:off x="1543740" y="7744376"/>
         <a:ext cx="1285247" cy="392000"/>
       </dsp:txXfrm>
     </dsp:sp>
@@ -14246,7 +14454,7 @@
       </dsp:nvSpPr>
       <dsp:spPr>
         <a:xfrm>
-          <a:off x="3086037" y="7329884"/>
+          <a:off x="3086037" y="7468048"/>
           <a:ext cx="1285247" cy="392000"/>
         </a:xfrm>
         <a:prstGeom prst="rect">
@@ -14314,7 +14522,7 @@
         </a:p>
       </dsp:txBody>
       <dsp:txXfrm>
-        <a:off x="3086037" y="7329884"/>
+        <a:off x="3086037" y="7468048"/>
         <a:ext cx="1285247" cy="392000"/>
       </dsp:txXfrm>
     </dsp:sp>
@@ -14325,7 +14533,7 @@
       </dsp:nvSpPr>
       <dsp:spPr>
         <a:xfrm>
-          <a:off x="3086037" y="7882540"/>
+          <a:off x="3086037" y="8020704"/>
           <a:ext cx="1285247" cy="392000"/>
         </a:xfrm>
         <a:prstGeom prst="rect">
@@ -14393,7 +14601,7 @@
         </a:p>
       </dsp:txBody>
       <dsp:txXfrm>
-        <a:off x="3086037" y="7882540"/>
+        <a:off x="3086037" y="8020704"/>
         <a:ext cx="1285247" cy="392000"/>
       </dsp:txXfrm>
     </dsp:sp>
@@ -14404,7 +14612,7 @@
       </dsp:nvSpPr>
       <dsp:spPr>
         <a:xfrm>
-          <a:off x="1543740" y="8435196"/>
+          <a:off x="1543740" y="8573360"/>
           <a:ext cx="1285247" cy="392000"/>
         </a:xfrm>
         <a:prstGeom prst="rect">
@@ -14472,7 +14680,7 @@
         </a:p>
       </dsp:txBody>
       <dsp:txXfrm>
-        <a:off x="1543740" y="8435196"/>
+        <a:off x="1543740" y="8573360"/>
         <a:ext cx="1285247" cy="392000"/>
       </dsp:txXfrm>
     </dsp:sp>
@@ -14483,7 +14691,7 @@
       </dsp:nvSpPr>
       <dsp:spPr>
         <a:xfrm>
-          <a:off x="3086037" y="8435196"/>
+          <a:off x="3086037" y="8573360"/>
           <a:ext cx="1285247" cy="392000"/>
         </a:xfrm>
         <a:prstGeom prst="rect">
@@ -14551,7 +14759,7 @@
         </a:p>
       </dsp:txBody>
       <dsp:txXfrm>
-        <a:off x="3086037" y="8435196"/>
+        <a:off x="3086037" y="8573360"/>
         <a:ext cx="1285247" cy="392000"/>
       </dsp:txXfrm>
     </dsp:sp>
@@ -34721,7 +34929,7 @@
             <p:ph idx="1"/>
             <p:extLst>
               <p:ext uri="{D42A27DB-BD31-4B8C-83A1-F6EECF244321}">
-                <p14:modId xmlns:p14="http://schemas.microsoft.com/office/powerpoint/2010/main" val="211670273"/>
+                <p14:modId xmlns:p14="http://schemas.microsoft.com/office/powerpoint/2010/main" val="957346601"/>
               </p:ext>
             </p:extLst>
           </p:nvPr>

</xml_diff>